<commit_message>
80% af XSLFSlide done
Mangler at fitte størrelsen på teksten sådan at det altid bare fylder hele slidet.
</commit_message>
<xml_diff>
--- a/powerpoint.pptx
+++ b/powerpoint.pptx
@@ -7,7 +7,7 @@
   <p:sldIdLst>
     <p:sldId id="256" r:id="rId6"/>
   </p:sldIdLst>
-  <p:sldSz cx="9144000" cy="6858000" type="screen4x3"/>
+  <p:sldSz cx="12192000" cy="6858000"/>
   <p:notesSz cx="6858000" cy="9144000"/>
   <p:defaultTextStyle>
     <a:defPPr>
@@ -709,6 +709,29 @@
       </p:grpSpPr>
       <p:sp>
         <p:nvSpPr>
+          <p:cNvPr id="2" name="Title 1"/>
+          <p:cNvSpPr>
+            <a:spLocks noGrp="1"/>
+          </p:cNvSpPr>
+          <p:nvPr>
+            <p:ph type="title"/>
+          </p:nvPr>
+        </p:nvSpPr>
+        <p:spPr/>
+        <p:txBody>
+          <a:bodyPr/>
+          <a:lstStyle/>
+          <a:p>
+            <a:r>
+              <a:rPr lang="en-US" smtClean="0"/>
+              <a:t>Click to edit Master title style</a:t>
+            </a:r>
+            <a:endParaRPr lang="en-US"/>
+          </a:p>
+        </p:txBody>
+      </p:sp>
+      <p:sp>
+        <p:nvSpPr>
           <p:cNvPr id="3" name="Content Placeholder 2"/>
           <p:cNvSpPr>
             <a:spLocks noGrp="1"/>
@@ -717,156 +740,112 @@
             <p:ph idx="1"/>
           </p:nvPr>
         </p:nvSpPr>
-        <p:spPr>
-          <a:xfrm>
-            <a:off x="0" y="1100830"/>
-            <a:ext cx="12192000" cy="5757169"/>
-          </a:xfrm>
-        </p:spPr>
-        <p:txBody>
-          <a:bodyPr>
-            <a:normAutofit/>
-          </a:bodyPr>
-          <a:lstStyle/>
-          <a:p>
-            <a:pPr indent="0" marL="0">
-              <a:lnSpc>
-                <a:spcPct val="90000"/>
-              </a:lnSpc>
-              <a:spcBef>
-                <a:spcPts val="1000"/>
-              </a:spcBef>
-              <a:buNone/>
-            </a:pPr>
-            <a:r>
-              <a:rPr dirty="0" lang="da-DK" sz="6000">
-                <a:latin charset="0" panose="02020603050405020304" pitchFamily="18" typeface="Times New Roman"/>
-                <a:cs charset="0" panose="02020603050405020304" pitchFamily="18" typeface="Times New Roman"/>
-              </a:rPr>
-              <a:t>I østen stiger solen op:</a:t>
-            </a:r>
-          </a:p>
-          <a:p>
-            <a:pPr indent="0" marL="0">
-              <a:lnSpc>
-                <a:spcPct val="90000"/>
-              </a:lnSpc>
-              <a:spcBef>
-                <a:spcPts val="1000"/>
-              </a:spcBef>
-              <a:buNone/>
-            </a:pPr>
-            <a:r>
-              <a:rPr dirty="0" lang="da-DK" sz="6000">
-                <a:latin charset="0" panose="02020603050405020304" pitchFamily="18" typeface="Times New Roman"/>
-                <a:cs charset="0" panose="02020603050405020304" pitchFamily="18" typeface="Times New Roman"/>
-              </a:rPr>
-              <a:t>Den spreder guld på sky,</a:t>
-            </a:r>
-          </a:p>
-          <a:p>
-            <a:pPr indent="0" marL="0">
-              <a:lnSpc>
-                <a:spcPct val="90000"/>
-              </a:lnSpc>
-              <a:spcBef>
-                <a:spcPts val="1000"/>
-              </a:spcBef>
-              <a:buNone/>
-            </a:pPr>
-            <a:r>
-              <a:rPr dirty="0" lang="da-DK" sz="6000">
-                <a:latin charset="0" panose="02020603050405020304" pitchFamily="18" typeface="Times New Roman"/>
-                <a:cs charset="0" panose="02020603050405020304" pitchFamily="18" typeface="Times New Roman"/>
-              </a:rPr>
-              <a:t>går over hav og </a:t>
-            </a:r>
-            <a:r>
-              <a:rPr dirty="0" err="1" lang="da-DK" sz="6000">
-                <a:latin charset="0" panose="02020603050405020304" pitchFamily="18" typeface="Times New Roman"/>
-                <a:cs charset="0" panose="02020603050405020304" pitchFamily="18" typeface="Times New Roman"/>
-              </a:rPr>
-              <a:t>bjergetop</a:t>
-            </a:r>
-            <a:r>
-              <a:rPr dirty="0" lang="da-DK" sz="6000">
-                <a:latin charset="0" panose="02020603050405020304" pitchFamily="18" typeface="Times New Roman"/>
-                <a:cs charset="0" panose="02020603050405020304" pitchFamily="18" typeface="Times New Roman"/>
-              </a:rPr>
-              <a:t>,</a:t>
-            </a:r>
-          </a:p>
-          <a:p>
-            <a:pPr indent="0" marL="0">
-              <a:lnSpc>
-                <a:spcPct val="90000"/>
-              </a:lnSpc>
-              <a:spcBef>
-                <a:spcPts val="1000"/>
-              </a:spcBef>
-              <a:buNone/>
-            </a:pPr>
-            <a:r>
-              <a:rPr dirty="0" lang="da-DK" sz="6000">
-                <a:latin charset="0" panose="02020603050405020304" pitchFamily="18" typeface="Times New Roman"/>
-                <a:cs charset="0" panose="02020603050405020304" pitchFamily="18" typeface="Times New Roman"/>
-              </a:rPr>
-              <a:t>går over land og by.</a:t>
-            </a:r>
-          </a:p>
-        </p:txBody>
-      </p:sp>
-      <p:sp>
-        <p:nvSpPr>
-          <p:cNvPr id="2" name="Tekstfelt 1">
-            <a:extLst>
-              <a:ext uri="{FF2B5EF4-FFF2-40B4-BE49-F238E27FC236}">
-                <a16:creationId xmlns:a16="http://schemas.microsoft.com/office/drawing/2014/main" id="{20A2F052-C996-4C1D-A2D7-491DD1ABEAA5}"/>
-              </a:ext>
-            </a:extLst>
-          </p:cNvPr>
-          <p:cNvSpPr txBox="1"/>
-          <p:nvPr/>
-        </p:nvSpPr>
-        <p:spPr>
-          <a:xfrm>
-            <a:off x="0" y="0"/>
-            <a:ext cx="12277817" cy="1384995"/>
-          </a:xfrm>
-          <a:prstGeom prst="rect">
-            <a:avLst/>
-          </a:prstGeom>
-          <a:noFill/>
-        </p:spPr>
-        <p:txBody>
-          <a:bodyPr rtlCol="0" wrap="square">
-            <a:spAutoFit/>
-          </a:bodyPr>
-          <a:lstStyle/>
-          <a:p>
-            <a:r>
-              <a:rPr dirty="0" lang="da-DK" sz="4800">
-                <a:latin charset="0" panose="02020603050405020304" pitchFamily="18" typeface="Times New Roman"/>
-                <a:cs charset="0" panose="02020603050405020304" pitchFamily="18" typeface="Times New Roman"/>
-              </a:rPr>
-              <a:t>1/7             </a:t>
-            </a:r>
-            <a:r>
-              <a:rPr dirty="0" i="1" lang="da-DK" sz="4800">
-                <a:latin charset="0" panose="02020603050405020304" pitchFamily="18" typeface="Times New Roman"/>
-                <a:cs charset="0" panose="02020603050405020304" pitchFamily="18" typeface="Times New Roman"/>
-              </a:rPr>
-              <a:t>B.S. Ingemann 1837.</a:t>
-            </a:r>
-          </a:p>
-          <a:p>
-            <a:endParaRPr dirty="0" lang="da-DK">
-              <a:latin charset="0" panose="02020603050405020304" pitchFamily="18" typeface="Times New Roman"/>
-              <a:cs charset="0" panose="02020603050405020304" pitchFamily="18" typeface="Times New Roman"/>
-            </a:endParaRPr>
-          </a:p>
-          <a:p>
-            <a:endParaRPr dirty="0" lang="en-US"/>
+        <p:spPr/>
+        <p:txBody>
+          <a:bodyPr/>
+          <a:lstStyle/>
+          <a:p>
+            <a:pPr lvl="0"/>
+            <a:r>
+              <a:rPr lang="en-US" smtClean="0"/>
+              <a:t>Click to edit Master text styles</a:t>
+            </a:r>
+          </a:p>
+          <a:p>
+            <a:pPr lvl="1"/>
+            <a:r>
+              <a:rPr lang="en-US" smtClean="0"/>
+              <a:t>Second level</a:t>
+            </a:r>
+          </a:p>
+          <a:p>
+            <a:pPr lvl="2"/>
+            <a:r>
+              <a:rPr lang="en-US" smtClean="0"/>
+              <a:t>Third level</a:t>
+            </a:r>
+          </a:p>
+          <a:p>
+            <a:pPr lvl="3"/>
+            <a:r>
+              <a:rPr lang="en-US" smtClean="0"/>
+              <a:t>Fourth level</a:t>
+            </a:r>
+          </a:p>
+          <a:p>
+            <a:pPr lvl="4"/>
+            <a:r>
+              <a:rPr lang="en-US" smtClean="0"/>
+              <a:t>Fifth level</a:t>
+            </a:r>
+            <a:endParaRPr lang="en-US"/>
+          </a:p>
+        </p:txBody>
+      </p:sp>
+      <p:sp>
+        <p:nvSpPr>
+          <p:cNvPr id="4" name="Date Placeholder 3"/>
+          <p:cNvSpPr>
+            <a:spLocks noGrp="1"/>
+          </p:cNvSpPr>
+          <p:nvPr>
+            <p:ph type="dt" sz="half" idx="10"/>
+          </p:nvPr>
+        </p:nvSpPr>
+        <p:spPr/>
+        <p:txBody>
+          <a:bodyPr/>
+          <a:lstStyle/>
+          <a:p>
+            <a:fld id="{1D8BD707-D9CF-40AE-B4C6-C98DA3205C09}" type="datetimeFigureOut">
+              <a:rPr lang="en-US" smtClean="0"/>
+              <a:pPr/>
+              <a:t>8/1/2011</a:t>
+            </a:fld>
+            <a:endParaRPr lang="en-US"/>
+          </a:p>
+        </p:txBody>
+      </p:sp>
+      <p:sp>
+        <p:nvSpPr>
+          <p:cNvPr id="5" name="Footer Placeholder 4"/>
+          <p:cNvSpPr>
+            <a:spLocks noGrp="1"/>
+          </p:cNvSpPr>
+          <p:nvPr>
+            <p:ph type="ftr" sz="quarter" idx="11"/>
+          </p:nvPr>
+        </p:nvSpPr>
+        <p:spPr/>
+        <p:txBody>
+          <a:bodyPr/>
+          <a:lstStyle/>
+          <a:p>
+            <a:endParaRPr lang="en-US"/>
+          </a:p>
+        </p:txBody>
+      </p:sp>
+      <p:sp>
+        <p:nvSpPr>
+          <p:cNvPr id="6" name="Slide Number Placeholder 5"/>
+          <p:cNvSpPr>
+            <a:spLocks noGrp="1"/>
+          </p:cNvSpPr>
+          <p:nvPr>
+            <p:ph type="sldNum" sz="quarter" idx="12"/>
+          </p:nvPr>
+        </p:nvSpPr>
+        <p:spPr/>
+        <p:txBody>
+          <a:bodyPr/>
+          <a:lstStyle/>
+          <a:p>
+            <a:fld id="{B6F15528-21DE-4FAA-801E-634DDDAF4B2B}" type="slidenum">
+              <a:rPr lang="en-US" smtClean="0"/>
+              <a:pPr/>
+              <a:t>‹#›</a:t>
+            </a:fld>
+            <a:endParaRPr lang="en-US"/>
           </a:p>
         </p:txBody>
       </p:sp>
@@ -2560,9 +2539,11 @@
 <p:sldMaster xmlns:a="http://schemas.openxmlformats.org/drawingml/2006/main" xmlns:r="http://schemas.openxmlformats.org/officeDocument/2006/relationships" xmlns:p="http://schemas.openxmlformats.org/presentationml/2006/main">
   <p:cSld>
     <p:bg>
-      <p:bgRef idx="1001">
-        <a:schemeClr val="bg1"/>
-      </p:bgRef>
+      <p:bgPr>
+        <a:solidFill>
+          <a:srgbClr val="000000"/>
+        </a:solidFill>
+      </p:bgPr>
     </p:bg>
     <p:spTree>
       <p:nvGrpSpPr>
@@ -3066,7 +3047,7 @@
 <file path=ppt/slides/slide1.xml><?xml version="1.0" encoding="utf-8"?>
 <p:sld xmlns:p="http://schemas.openxmlformats.org/presentationml/2006/main" xmlns:a="http://schemas.openxmlformats.org/drawingml/2006/main">
   <p:cSld>
-    <p:spTree>
+    <p:spTree xmlns:r="http://schemas.openxmlformats.org/officeDocument/2006/relationships">
       <p:nvGrpSpPr>
         <p:cNvPr id="1" name=""/>
         <p:cNvGrpSpPr/>
@@ -3080,40 +3061,89 @@
           <a:chExt cx="0" cy="0"/>
         </a:xfrm>
       </p:grpSpPr>
-      <p:sp xmlns:r="http://schemas.openxmlformats.org/officeDocument/2006/relationships">
-        <p:nvSpPr>
-          <p:cNvPr id="3" name="Content Placeholder 2"/>
-          <p:cNvSpPr>
-            <a:spLocks noGrp="1"/>
-          </p:cNvSpPr>
-          <p:nvPr>
-            <p:ph idx="1"/>
+      <p:sp>
+        <p:nvSpPr>
+          <p:cNvPr id="3" name="Pladsholder til indhold 2">
+            <a:extLst>
+              <a:ext uri="{FF2B5EF4-FFF2-40B4-BE49-F238E27FC236}">
+                <a16:creationId xmlns:a16="http://schemas.microsoft.com/office/drawing/2014/main" id="{DD8DA53B-6F09-46A0-8670-F938494D5F38}"/>
+              </a:ext>
+            </a:extLst>
+          </p:cNvPr>
+          <p:cNvSpPr>
+            <a:spLocks noGrp="1"/>
+          </p:cNvSpPr>
+          <p:nvPr>
+            <p:ph idx="1" sz="half"/>
           </p:nvPr>
         </p:nvSpPr>
         <p:spPr>
           <a:xfrm>
-            <a:off x="0" y="1100830"/>
-            <a:ext cx="12192000" cy="5757169"/>
+            <a:off x="0" y="990600"/>
+            <a:ext cx="12192000" cy="5845175"/>
           </a:xfrm>
         </p:spPr>
         <p:txBody>
-          <a:bodyPr>
-            <a:normAutofit/>
-          </a:bodyPr>
-          <a:lstStyle/>
-          <a:p>
-            <a:r>
-              <a:rPr lang="en-US" sz="3000"/>
-              <a:t>
-             Så vældigt det mødte
-os først i vor dåb,
-det ord, der genfødte
-til levende håb,
-det ord om den morgen,
-der underfuldt kom
-og svarede sorgen:
-»Se, graven er tom!«
+          <a:bodyPr/>
+          <a:lstStyle/>
+          <a:p>
+            <a:pPr>
+              <a:buNone/>
+            </a:pPr>
+            <a:r>
+              <a:rPr lang="en-US" sz="4000">
+                <a:solidFill>
+                  <a:srgbClr val="FFFFFF"/>
+                </a:solidFill>
+                <a:latin typeface="TIMES_NEW_ROMAN"/>
+              </a:rPr>
+              <a:t>Jeg lever - og ved hvor længe fuldtrøst:
+jeg lever, til Herren mig kalder;
+jeg lever og venter den kaldende røst,
+jeg lever som gæsten på fremmed kyst,
+til Faderen barnet hjemkalder.
           </a:t>
+            </a:r>
+          </a:p>
+        </p:txBody>
+      </p:sp>
+      <p:sp>
+        <p:nvSpPr>
+          <p:cNvPr id="4" name="Pladsholder til indhold 3">
+            <a:extLst>
+              <a:ext uri="{FF2B5EF4-FFF2-40B4-BE49-F238E27FC236}">
+                <a16:creationId xmlns:a16="http://schemas.microsoft.com/office/drawing/2014/main" id="{51AF507C-229C-4349-9C96-82EDB0BA7DFB}"/>
+              </a:ext>
+            </a:extLst>
+          </p:cNvPr>
+          <p:cNvSpPr>
+            <a:spLocks noGrp="1"/>
+          </p:cNvSpPr>
+          <p:nvPr>
+            <p:ph idx="2" sz="half"/>
+          </p:nvPr>
+        </p:nvSpPr>
+        <p:spPr>
+          <a:xfrm>
+            <a:off x="0" y="22225"/>
+            <a:ext cx="12192000" cy="1803400"/>
+          </a:xfrm>
+        </p:spPr>
+        <p:txBody>
+          <a:bodyPr/>
+          <a:lstStyle/>
+          <a:p>
+            <a:pPr>
+              <a:buNone/>
+            </a:pPr>
+            <a:r>
+              <a:rPr lang="en-US">
+                <a:solidFill>
+                  <a:srgbClr val="FFFFFF"/>
+                </a:solidFill>
+                <a:latin typeface="TIMES_NEW_ROMAN"/>
+              </a:rPr>
+              <a:t>1/4          Str. 1: Martin Luther 1531. Str. 1-4: B.S. Ingemann 1851.</a:t>
             </a:r>
           </a:p>
         </p:txBody>

</xml_diff>

<commit_message>
Should be final push
</commit_message>
<xml_diff>
--- a/powerpoint.pptx
+++ b/powerpoint.pptx
@@ -3097,12 +3097,13 @@
                 </a:solidFill>
                 <a:latin typeface="Times New Roman"/>
               </a:rPr>
-              <a:t>Giv mig, Gud, en salmetunge,
-så for dig jeg ret kan sjunge
-højt og lydelig,
-så jeg føle kan med glæde:
-sødt det er om dig at kvæde
-uden skrømt og svig!
+              <a:t>O Gud, min synd du sænke ned,
+hvor havet dybt mon være,
+ifør mig din retfærdighed,
+forny mig til din ære!
+Et helligt hjerte her mig giv,
+så får mit støv vel engang liv,
+som ej har død i vente!
           </a:t>
             </a:r>
           </a:p>
@@ -3144,7 +3145,7 @@
                 </a:solidFill>
                 <a:latin typeface="Times New Roman"/>
               </a:rPr>
-              <a:t>1/8          N.F.S. Grundtvig 1836 og 1868.</a:t>
+              <a:t>1/1          Johann Heermann 1630. Søren Jonæsøn 1693. Bearbejdet 1935.</a:t>
             </a:r>
           </a:p>
         </p:txBody>

</xml_diff>